<commit_message>
Update Status Report Grupo 4.pptx
</commit_message>
<xml_diff>
--- a/Colegio911/Doc/Status Report Grupo 4.pptx
+++ b/Colegio911/Doc/Status Report Grupo 4.pptx
@@ -256,7 +256,7 @@
           <a:p>
             <a:fld id="{5116071C-5EFE-4FC3-98E4-E05BAD8C5E2F}" type="datetimeFigureOut">
               <a:rPr lang="pt-BR" smtClean="0"/>
-              <a:t>29/05/2019</a:t>
+              <a:t>05/06/2019</a:t>
             </a:fld>
             <a:endParaRPr lang="pt-BR"/>
           </a:p>
@@ -5841,14 +5841,14 @@
           <p:nvPr>
             <p:extLst>
               <p:ext uri="{D42A27DB-BD31-4B8C-83A1-F6EECF244321}">
-                <p14:modId xmlns:p14="http://schemas.microsoft.com/office/powerpoint/2010/main" val="578079194"/>
+                <p14:modId xmlns:p14="http://schemas.microsoft.com/office/powerpoint/2010/main" val="2546174790"/>
               </p:ext>
             </p:extLst>
           </p:nvPr>
         </p:nvGraphicFramePr>
         <p:xfrm>
           <a:off x="251520" y="861242"/>
-          <a:ext cx="8371309" cy="6268216"/>
+          <a:ext cx="8371309" cy="6910007"/>
         </p:xfrm>
         <a:graphic>
           <a:graphicData uri="http://schemas.openxmlformats.org/drawingml/2006/table">
@@ -6943,7 +6943,19 @@
                         <a:rPr lang="pt-PT" sz="1600" dirty="0" smtClean="0">
                           <a:effectLst/>
                         </a:rPr>
-                        <a:t>Chobela, Amancio</a:t>
+                        <a:t>Chobela</a:t>
+                      </a:r>
+                      <a:r>
+                        <a:rPr lang="pt-PT" sz="1600" smtClean="0">
+                          <a:effectLst/>
+                        </a:rPr>
+                        <a:t>, </a:t>
+                      </a:r>
+                      <a:r>
+                        <a:rPr lang="pt-PT" sz="1600" smtClean="0">
+                          <a:effectLst/>
+                        </a:rPr>
+                        <a:t>Amancio &amp; Baloi, Issaque</a:t>
                       </a:r>
                       <a:endParaRPr lang="en-US" sz="1400" dirty="0">
                         <a:effectLst/>
@@ -7634,7 +7646,7 @@
         </p:nvGraphicFramePr>
         <p:xfrm>
           <a:off x="323528" y="1196752"/>
-          <a:ext cx="8280920" cy="5205735"/>
+          <a:ext cx="8280920" cy="5245168"/>
         </p:xfrm>
         <a:graphic>
           <a:graphicData uri="http://schemas.openxmlformats.org/drawingml/2006/table">
@@ -9276,11 +9288,7 @@
           <a:p>
             <a:r>
               <a:rPr lang="pt-PT" dirty="0" smtClean="0"/>
-              <a:t>O </a:t>
-            </a:r>
-            <a:r>
-              <a:rPr lang="pt-PT" dirty="0" smtClean="0"/>
-              <a:t>Controle de desenvolvimento, </a:t>
+              <a:t>O Controle de desenvolvimento, </a:t>
             </a:r>
             <a:r>
               <a:rPr lang="en-US" dirty="0" err="1" smtClean="0"/>

</xml_diff>